<commit_message>
Working (better) Model ~Created~ 1. Better Model, anyways ~Fixed~ 1. Keras seems to not shuffle validation data, which is sad. Scikitlearn is now used to make it a little less sad. Boo Woo ~TODO~ Validate this model!
</commit_message>
<xml_diff>
--- a/Byte-Pair/BPE.pptx
+++ b/Byte-Pair/BPE.pptx
@@ -239,7 +239,7 @@
           <a:p>
             <a:fld id="{1939C193-D30F-4B7A-8956-32E4F6D9D2C9}" type="datetimeFigureOut">
               <a:rPr lang="en-US" smtClean="0"/>
-              <a:t>10/8/19</a:t>
+              <a:t>12/18/19</a:t>
             </a:fld>
             <a:endParaRPr lang="en-US" dirty="0"/>
           </a:p>
@@ -416,7 +416,7 @@
           <a:p>
             <a:fld id="{9A6AC78B-5884-4D24-983C-916233003E85}" type="datetimeFigureOut">
               <a:rPr lang="en-US" smtClean="0"/>
-              <a:t>10/8/19</a:t>
+              <a:t>12/18/19</a:t>
             </a:fld>
             <a:endParaRPr lang="en-US" dirty="0"/>
           </a:p>
@@ -1394,7 +1394,7 @@
           <a:p>
             <a:fld id="{F35A1469-2D5F-4CF6-9A65-876A4BCDDACA}" type="datetime8">
               <a:rPr lang="en-US" noProof="0" smtClean="0"/>
-              <a:t>10/8/19 2:31 PM</a:t>
+              <a:t>12/18/19 12:07 PM</a:t>
             </a:fld>
             <a:endParaRPr lang="en-US" noProof="0" dirty="0"/>
           </a:p>
@@ -1575,7 +1575,7 @@
           <a:p>
             <a:fld id="{B6FEBBCD-CBA1-4D0B-806D-FC14D8656200}" type="datetime8">
               <a:rPr lang="en-US" noProof="0" smtClean="0"/>
-              <a:t>10/8/19 2:31 PM</a:t>
+              <a:t>12/18/19 12:07 PM</a:t>
             </a:fld>
             <a:endParaRPr lang="en-US" noProof="0" dirty="0"/>
           </a:p>
@@ -2218,7 +2218,7 @@
           <a:p>
             <a:fld id="{A272C437-5C9D-4B1A-9C56-1C544AB8146E}" type="datetime8">
               <a:rPr lang="en-US" noProof="0" smtClean="0"/>
-              <a:t>10/8/19 2:31 PM</a:t>
+              <a:t>12/18/19 12:07 PM</a:t>
             </a:fld>
             <a:endParaRPr lang="en-US" noProof="0" dirty="0"/>
           </a:p>
@@ -2346,7 +2346,7 @@
           <a:p>
             <a:fld id="{A272C437-5C9D-4B1A-9C56-1C544AB8146E}" type="datetime8">
               <a:rPr lang="en-US" noProof="0" smtClean="0"/>
-              <a:t>10/8/19 2:31 PM</a:t>
+              <a:t>12/18/19 12:07 PM</a:t>
             </a:fld>
             <a:endParaRPr lang="en-US" noProof="0" dirty="0"/>
           </a:p>
@@ -2598,7 +2598,7 @@
           <a:p>
             <a:fld id="{A272C437-5C9D-4B1A-9C56-1C544AB8146E}" type="datetime8">
               <a:rPr lang="en-US" noProof="0" smtClean="0"/>
-              <a:t>10/8/19 2:31 PM</a:t>
+              <a:t>12/18/19 12:07 PM</a:t>
             </a:fld>
             <a:endParaRPr lang="en-US" noProof="0" dirty="0"/>
           </a:p>
@@ -2699,7 +2699,7 @@
           <a:p>
             <a:fld id="{CECF2D3B-BB2C-4EA8-8616-6D874F8BB777}" type="datetime8">
               <a:rPr lang="en-US" noProof="0" smtClean="0"/>
-              <a:t>10/8/19 2:31 PM</a:t>
+              <a:t>12/18/19 12:07 PM</a:t>
             </a:fld>
             <a:endParaRPr lang="en-US" noProof="0" dirty="0"/>
           </a:p>
@@ -3003,7 +3003,7 @@
           <a:p>
             <a:fld id="{D685E975-0B6B-4B58-A4AA-C8F33B87478E}" type="datetime8">
               <a:rPr lang="en-US" noProof="0" smtClean="0"/>
-              <a:t>10/8/19 2:31 PM</a:t>
+              <a:t>12/18/19 12:07 PM</a:t>
             </a:fld>
             <a:endParaRPr lang="en-US" noProof="0" dirty="0"/>
           </a:p>
@@ -3208,7 +3208,7 @@
           <a:p>
             <a:fld id="{D685E975-0B6B-4B58-A4AA-C8F33B87478E}" type="datetime8">
               <a:rPr lang="en-US" noProof="0" smtClean="0"/>
-              <a:t>10/8/19 2:31 PM</a:t>
+              <a:t>12/18/19 12:07 PM</a:t>
             </a:fld>
             <a:endParaRPr lang="en-US" noProof="0" dirty="0"/>
           </a:p>
@@ -3711,7 +3711,7 @@
           <a:p>
             <a:fld id="{0CEE1DAB-B868-4EEB-BD54-B9BAB6F58361}" type="datetime8">
               <a:rPr lang="en-US" noProof="0" smtClean="0"/>
-              <a:t>10/8/19 2:31 PM</a:t>
+              <a:t>12/18/19 12:07 PM</a:t>
             </a:fld>
             <a:endParaRPr lang="en-US" noProof="0" dirty="0"/>
           </a:p>
@@ -3957,7 +3957,7 @@
           <a:p>
             <a:fld id="{525A88A9-102E-4111-86E0-D51E9CB704AA}" type="datetime8">
               <a:rPr lang="en-US" noProof="0" smtClean="0"/>
-              <a:t>10/8/19 2:31 PM</a:t>
+              <a:t>12/18/19 12:07 PM</a:t>
             </a:fld>
             <a:endParaRPr lang="en-US" noProof="0" dirty="0"/>
           </a:p>
@@ -4136,7 +4136,7 @@
           <a:p>
             <a:fld id="{A346BD67-B37A-4DEF-9054-A91A6B18355E}" type="datetime8">
               <a:rPr lang="en-US" noProof="0" smtClean="0"/>
-              <a:t>10/8/19 2:31 PM</a:t>
+              <a:t>12/18/19 12:07 PM</a:t>
             </a:fld>
             <a:endParaRPr lang="en-US" noProof="0" dirty="0"/>
           </a:p>
@@ -4441,7 +4441,7 @@
           <a:p>
             <a:fld id="{F39235B7-901B-460F-BE63-E630BF7AD92D}" type="datetime8">
               <a:rPr lang="en-US" noProof="0" smtClean="0"/>
-              <a:t>10/8/19 2:31 PM</a:t>
+              <a:t>12/18/19 12:07 PM</a:t>
             </a:fld>
             <a:endParaRPr lang="en-US" noProof="0" dirty="0"/>
           </a:p>
@@ -4623,7 +4623,7 @@
           <a:p>
             <a:fld id="{B3601C1E-44EC-4ED6-87AC-7B26C9BC7568}" type="datetime8">
               <a:rPr lang="en-US" noProof="0" smtClean="0"/>
-              <a:t>10/8/19 2:31 PM</a:t>
+              <a:t>12/18/19 12:07 PM</a:t>
             </a:fld>
             <a:endParaRPr lang="en-US" noProof="0" dirty="0"/>
           </a:p>
@@ -5146,7 +5146,7 @@
           <a:p>
             <a:fld id="{4AE13B8D-7A39-483F-9092-AB66B2338492}" type="datetime8">
               <a:rPr lang="en-US" noProof="0" smtClean="0"/>
-              <a:t>10/8/19 2:31 PM</a:t>
+              <a:t>12/18/19 12:07 PM</a:t>
             </a:fld>
             <a:endParaRPr lang="en-US" noProof="0" dirty="0"/>
           </a:p>
@@ -5655,7 +5655,7 @@
           <a:p>
             <a:fld id="{7A1B421F-7852-47A7-8672-3F4B3DC607FF}" type="datetime8">
               <a:rPr lang="en-US" noProof="0" smtClean="0"/>
-              <a:t>10/8/19 2:31 PM</a:t>
+              <a:t>12/18/19 12:07 PM</a:t>
             </a:fld>
             <a:endParaRPr lang="en-US" noProof="0" dirty="0"/>
           </a:p>
@@ -5842,7 +5842,7 @@
           <a:p>
             <a:fld id="{6A1CE990-BAB9-4562-95E3-50660C2796F3}" type="datetime8">
               <a:rPr lang="en-US" noProof="0" smtClean="0"/>
-              <a:t>10/8/19 2:31 PM</a:t>
+              <a:t>12/18/19 12:07 PM</a:t>
             </a:fld>
             <a:endParaRPr lang="en-US" noProof="0" dirty="0"/>
           </a:p>
@@ -6530,7 +6530,7 @@
           <a:p>
             <a:fld id="{9E139DA8-D636-4336-B416-25DD0050B639}" type="datetime8">
               <a:rPr lang="en-US" noProof="0" smtClean="0"/>
-              <a:t>10/8/19 2:31 PM</a:t>
+              <a:t>12/18/19 12:07 PM</a:t>
             </a:fld>
             <a:endParaRPr lang="en-US" noProof="0" dirty="0"/>
           </a:p>
@@ -17128,20 +17128,20 @@
 </file>
 
 <file path=customXml/item2.xml><?xml version="1.0" encoding="utf-8"?>
-<p:properties xmlns:p="http://schemas.microsoft.com/office/2006/metadata/properties" xmlns:xsi="http://www.w3.org/2001/XMLSchema-instance" xmlns:pc="http://schemas.microsoft.com/office/infopath/2007/PartnerControls">
-  <documentManagement>
-    <MediaServiceKeyPoints xmlns="71af3243-3dd4-4a8d-8c0d-dd76da1f02a5" xsi:nil="true"/>
-  </documentManagement>
-</p:properties>
-</file>
-
-<file path=customXml/item3.xml><?xml version="1.0" encoding="utf-8"?>
 <?mso-contentType ?>
 <FormTemplates xmlns="http://schemas.microsoft.com/sharepoint/v3/contenttype/forms">
   <Display>DocumentLibraryForm</Display>
   <Edit>DocumentLibraryForm</Edit>
   <New>DocumentLibraryForm</New>
 </FormTemplates>
+</file>
+
+<file path=customXml/item3.xml><?xml version="1.0" encoding="utf-8"?>
+<p:properties xmlns:p="http://schemas.microsoft.com/office/2006/metadata/properties" xmlns:xsi="http://www.w3.org/2001/XMLSchema-instance" xmlns:pc="http://schemas.microsoft.com/office/infopath/2007/PartnerControls">
+  <documentManagement>
+    <MediaServiceKeyPoints xmlns="71af3243-3dd4-4a8d-8c0d-dd76da1f02a5" xsi:nil="true"/>
+  </documentManagement>
+</p:properties>
 </file>
 
 <file path=customXml/itemProps1.xml><?xml version="1.0" encoding="utf-8"?>
@@ -17164,6 +17164,14 @@
 </file>
 
 <file path=customXml/itemProps2.xml><?xml version="1.0" encoding="utf-8"?>
+<ds:datastoreItem xmlns:ds="http://schemas.openxmlformats.org/officeDocument/2006/customXml" ds:itemID="{246B2BE6-8FE9-4318-AA40-8F70CEED609D}">
+  <ds:schemaRefs>
+    <ds:schemaRef ds:uri="http://schemas.microsoft.com/sharepoint/v3/contenttype/forms"/>
+  </ds:schemaRefs>
+</ds:datastoreItem>
+</file>
+
+<file path=customXml/itemProps3.xml><?xml version="1.0" encoding="utf-8"?>
 <ds:datastoreItem xmlns:ds="http://schemas.openxmlformats.org/officeDocument/2006/customXml" ds:itemID="{2CF39AE0-32C9-4F1D-B08C-0B8B9BAFC18D}">
   <ds:schemaRefs>
     <ds:schemaRef ds:uri="http://schemas.microsoft.com/office/2006/metadata/properties"/>
@@ -17171,12 +17179,4 @@
     <ds:schemaRef ds:uri="71af3243-3dd4-4a8d-8c0d-dd76da1f02a5"/>
   </ds:schemaRefs>
 </ds:datastoreItem>
-</file>
-
-<file path=customXml/itemProps3.xml><?xml version="1.0" encoding="utf-8"?>
-<ds:datastoreItem xmlns:ds="http://schemas.openxmlformats.org/officeDocument/2006/customXml" ds:itemID="{246B2BE6-8FE9-4318-AA40-8F70CEED609D}">
-  <ds:schemaRefs>
-    <ds:schemaRef ds:uri="http://schemas.microsoft.com/sharepoint/v3/contenttype/forms"/>
-  </ds:schemaRefs>
-</ds:datastoreItem>
 </file>
</xml_diff>